<commit_message>
rating once when user order product
</commit_message>
<xml_diff>
--- a/reports/Daily Scrum/Bao_Cao_Tien_Do_Cong_Viec_26-05-2021.pptx
+++ b/reports/Daily Scrum/Bao_Cao_Tien_Do_Cong_Viec_26-05-2021.pptx
@@ -248,7 +248,7 @@
       <p15:sldGuideLst xmlns:p15="http://schemas.microsoft.com/office/powerpoint/2012/main"/>
     </p:ext>
     <p:ext uri="http://customooxmlschemas.google.com/">
-      <go:slidesCustomData xmlns="" xmlns:mc="http://schemas.openxmlformats.org/markup-compatibility/2006" xmlns:mv="urn:schemas-microsoft-com:mac:vml" xmlns:c="http://schemas.openxmlformats.org/drawingml/2006/chart" xmlns:dgm="http://schemas.openxmlformats.org/drawingml/2006/diagram" xmlns:o="urn:schemas-microsoft-com:office:office" xmlns:v="urn:schemas-microsoft-com:vml" xmlns:pvml="urn:schemas-microsoft-com:office:powerpoint" xmlns:com="http://schemas.openxmlformats.org/drawingml/2006/compatibility" xmlns:p14="http://schemas.microsoft.com/office/powerpoint/2010/main" xmlns:p15="http://schemas.microsoft.com/office/powerpoint/2012/main" xmlns:ahyp="http://schemas.microsoft.com/office/drawing/2018/hyperlinkcolor" xmlns:go="http://customooxmlschemas.google.com/" r:id="rId10" roundtripDataSignature="AMtx7mghNSnxQ9l0C20/qzc99mpsPxlxnQ=="/>
+      <go:slidesCustomData xmlns:go="http://customooxmlschemas.google.com/" xmlns:ahyp="http://schemas.microsoft.com/office/drawing/2018/hyperlinkcolor" xmlns:p15="http://schemas.microsoft.com/office/powerpoint/2012/main" xmlns:p14="http://schemas.microsoft.com/office/powerpoint/2010/main" xmlns:com="http://schemas.openxmlformats.org/drawingml/2006/compatibility" xmlns:pvml="urn:schemas-microsoft-com:office:powerpoint" xmlns:v="urn:schemas-microsoft-com:vml" xmlns:o="urn:schemas-microsoft-com:office:office" xmlns:dgm="http://schemas.openxmlformats.org/drawingml/2006/diagram" xmlns:c="http://schemas.openxmlformats.org/drawingml/2006/chart" xmlns:mv="urn:schemas-microsoft-com:mac:vml" xmlns:mc="http://schemas.openxmlformats.org/markup-compatibility/2006" xmlns="" r:id="rId10" roundtripDataSignature="AMtx7mghNSnxQ9l0C20/qzc99mpsPxlxnQ=="/>
     </p:ext>
   </p:extLst>
 </p:presentation>
@@ -26019,7 +26019,7 @@
           <p:nvPr>
             <p:extLst>
               <p:ext uri="{D42A27DB-BD31-4B8C-83A1-F6EECF244321}">
-                <p14:modId xmlns:p14="http://schemas.microsoft.com/office/powerpoint/2010/main" val="3082636452"/>
+                <p14:modId xmlns:p14="http://schemas.microsoft.com/office/powerpoint/2010/main" val="2689582980"/>
               </p:ext>
             </p:extLst>
           </p:nvPr>
@@ -26422,7 +26422,7 @@
                       <a:pPr algn="ctr"/>
                       <a:r>
                         <a:rPr lang="en-US" sz="1600"/>
-                        <a:t>Viết báo cáo cho chức năng đánh giá, bình luận sản phẩm.</a:t>
+                        <a:t>Viết báo cáo cho chức năng đánh giá, bình luận sản phẩm</a:t>
                       </a:r>
                     </a:p>
                   </a:txBody>

</xml_diff>